<commit_message>
AR V07, En Prez, OP name filter
</commit_message>
<xml_diff>
--- a/I_godina/I_semestar/Engleski/Prezentacija/Presentation.pptx
+++ b/I_godina/I_semestar/Engleski/Prezentacija/Presentation.pptx
@@ -267,7 +267,7 @@
           <a:p>
             <a:fld id="{1F7A9E03-690E-441B-BA3B-1CC4C89A0BEF}" type="datetimeFigureOut">
               <a:rPr lang="sr-Latn-RS" smtClean="0"/>
-              <a:t>15.11.2023.</a:t>
+              <a:t>6.12.2023.</a:t>
             </a:fld>
             <a:endParaRPr lang="sr-Latn-RS"/>
           </a:p>
@@ -467,7 +467,7 @@
           <a:p>
             <a:fld id="{1F7A9E03-690E-441B-BA3B-1CC4C89A0BEF}" type="datetimeFigureOut">
               <a:rPr lang="sr-Latn-RS" smtClean="0"/>
-              <a:t>15.11.2023.</a:t>
+              <a:t>6.12.2023.</a:t>
             </a:fld>
             <a:endParaRPr lang="sr-Latn-RS"/>
           </a:p>
@@ -677,7 +677,7 @@
           <a:p>
             <a:fld id="{1F7A9E03-690E-441B-BA3B-1CC4C89A0BEF}" type="datetimeFigureOut">
               <a:rPr lang="sr-Latn-RS" smtClean="0"/>
-              <a:t>15.11.2023.</a:t>
+              <a:t>6.12.2023.</a:t>
             </a:fld>
             <a:endParaRPr lang="sr-Latn-RS"/>
           </a:p>
@@ -877,7 +877,7 @@
           <a:p>
             <a:fld id="{1F7A9E03-690E-441B-BA3B-1CC4C89A0BEF}" type="datetimeFigureOut">
               <a:rPr lang="sr-Latn-RS" smtClean="0"/>
-              <a:t>15.11.2023.</a:t>
+              <a:t>6.12.2023.</a:t>
             </a:fld>
             <a:endParaRPr lang="sr-Latn-RS"/>
           </a:p>
@@ -1153,7 +1153,7 @@
           <a:p>
             <a:fld id="{1F7A9E03-690E-441B-BA3B-1CC4C89A0BEF}" type="datetimeFigureOut">
               <a:rPr lang="sr-Latn-RS" smtClean="0"/>
-              <a:t>15.11.2023.</a:t>
+              <a:t>6.12.2023.</a:t>
             </a:fld>
             <a:endParaRPr lang="sr-Latn-RS"/>
           </a:p>
@@ -1421,7 +1421,7 @@
           <a:p>
             <a:fld id="{1F7A9E03-690E-441B-BA3B-1CC4C89A0BEF}" type="datetimeFigureOut">
               <a:rPr lang="sr-Latn-RS" smtClean="0"/>
-              <a:t>15.11.2023.</a:t>
+              <a:t>6.12.2023.</a:t>
             </a:fld>
             <a:endParaRPr lang="sr-Latn-RS"/>
           </a:p>
@@ -1836,7 +1836,7 @@
           <a:p>
             <a:fld id="{1F7A9E03-690E-441B-BA3B-1CC4C89A0BEF}" type="datetimeFigureOut">
               <a:rPr lang="sr-Latn-RS" smtClean="0"/>
-              <a:t>15.11.2023.</a:t>
+              <a:t>6.12.2023.</a:t>
             </a:fld>
             <a:endParaRPr lang="sr-Latn-RS"/>
           </a:p>
@@ -1978,7 +1978,7 @@
           <a:p>
             <a:fld id="{1F7A9E03-690E-441B-BA3B-1CC4C89A0BEF}" type="datetimeFigureOut">
               <a:rPr lang="sr-Latn-RS" smtClean="0"/>
-              <a:t>15.11.2023.</a:t>
+              <a:t>6.12.2023.</a:t>
             </a:fld>
             <a:endParaRPr lang="sr-Latn-RS"/>
           </a:p>
@@ -2091,7 +2091,7 @@
           <a:p>
             <a:fld id="{1F7A9E03-690E-441B-BA3B-1CC4C89A0BEF}" type="datetimeFigureOut">
               <a:rPr lang="sr-Latn-RS" smtClean="0"/>
-              <a:t>15.11.2023.</a:t>
+              <a:t>6.12.2023.</a:t>
             </a:fld>
             <a:endParaRPr lang="sr-Latn-RS"/>
           </a:p>
@@ -2404,7 +2404,7 @@
           <a:p>
             <a:fld id="{1F7A9E03-690E-441B-BA3B-1CC4C89A0BEF}" type="datetimeFigureOut">
               <a:rPr lang="sr-Latn-RS" smtClean="0"/>
-              <a:t>15.11.2023.</a:t>
+              <a:t>6.12.2023.</a:t>
             </a:fld>
             <a:endParaRPr lang="sr-Latn-RS"/>
           </a:p>
@@ -2693,7 +2693,7 @@
           <a:p>
             <a:fld id="{1F7A9E03-690E-441B-BA3B-1CC4C89A0BEF}" type="datetimeFigureOut">
               <a:rPr lang="sr-Latn-RS" smtClean="0"/>
-              <a:t>15.11.2023.</a:t>
+              <a:t>6.12.2023.</a:t>
             </a:fld>
             <a:endParaRPr lang="sr-Latn-RS"/>
           </a:p>
@@ -2936,7 +2936,7 @@
           <a:p>
             <a:fld id="{1F7A9E03-690E-441B-BA3B-1CC4C89A0BEF}" type="datetimeFigureOut">
               <a:rPr lang="sr-Latn-RS" smtClean="0"/>
-              <a:t>15.11.2023.</a:t>
+              <a:t>6.12.2023.</a:t>
             </a:fld>
             <a:endParaRPr lang="sr-Latn-RS"/>
           </a:p>
@@ -8003,7 +8003,7 @@
           <a:lstStyle/>
           <a:p>
             <a:pPr algn="ctr"/>
-            <a:endParaRPr lang="sr-Latn-RS"/>
+            <a:endParaRPr lang="sr-Latn-RS" dirty="0"/>
           </a:p>
         </p:txBody>
       </p:sp>
@@ -9723,6 +9723,371 @@
           <a:prstGeom prst="rect">
             <a:avLst/>
           </a:prstGeom>
+        </p:spPr>
+      </p:pic>
+      <p:sp>
+        <p:nvSpPr>
+          <p:cNvPr id="2" name="TextBox 1">
+            <a:extLst>
+              <a:ext uri="{FF2B5EF4-FFF2-40B4-BE49-F238E27FC236}">
+                <a16:creationId xmlns:a16="http://schemas.microsoft.com/office/drawing/2014/main" id="{BAEF1267-E68E-B8C9-21D7-D84D13FCCF54}"/>
+              </a:ext>
+            </a:extLst>
+          </p:cNvPr>
+          <p:cNvSpPr txBox="1"/>
+          <p:nvPr/>
+        </p:nvSpPr>
+        <p:spPr>
+          <a:xfrm>
+            <a:off x="932007" y="817594"/>
+            <a:ext cx="10522734" cy="369332"/>
+          </a:xfrm>
+          <a:prstGeom prst="rect">
+            <a:avLst/>
+          </a:prstGeom>
+          <a:noFill/>
+        </p:spPr>
+        <p:txBody>
+          <a:bodyPr wrap="square" rtlCol="0">
+            <a:spAutoFit/>
+          </a:bodyPr>
+          <a:lstStyle/>
+          <a:p>
+            <a:r>
+              <a:rPr lang="sr-Latn-RS" dirty="0">
+                <a:solidFill>
+                  <a:srgbClr val="43FF47"/>
+                </a:solidFill>
+                <a:latin typeface="Consolas" panose="020B0609020204030204" pitchFamily="49" charset="0"/>
+                <a:cs typeface="Times New Roman" panose="02020603050405020304" pitchFamily="18" charset="0"/>
+              </a:rPr>
+              <a:t>.</a:t>
+            </a:r>
+          </a:p>
+        </p:txBody>
+      </p:sp>
+      <p:sp>
+        <p:nvSpPr>
+          <p:cNvPr id="3" name="TextBox 2">
+            <a:extLst>
+              <a:ext uri="{FF2B5EF4-FFF2-40B4-BE49-F238E27FC236}">
+                <a16:creationId xmlns:a16="http://schemas.microsoft.com/office/drawing/2014/main" id="{21BB8247-CCB3-D3A3-95A7-1CB65ED2BA3F}"/>
+              </a:ext>
+            </a:extLst>
+          </p:cNvPr>
+          <p:cNvSpPr txBox="1"/>
+          <p:nvPr/>
+        </p:nvSpPr>
+        <p:spPr>
+          <a:xfrm>
+            <a:off x="932007" y="1302208"/>
+            <a:ext cx="10522734" cy="369332"/>
+          </a:xfrm>
+          <a:prstGeom prst="rect">
+            <a:avLst/>
+          </a:prstGeom>
+          <a:noFill/>
+        </p:spPr>
+        <p:txBody>
+          <a:bodyPr wrap="square" rtlCol="0">
+            <a:spAutoFit/>
+          </a:bodyPr>
+          <a:lstStyle/>
+          <a:p>
+            <a:r>
+              <a:rPr lang="sr-Latn-RS">
+                <a:solidFill>
+                  <a:srgbClr val="43FF47"/>
+                </a:solidFill>
+                <a:latin typeface="Consolas" panose="020B0609020204030204" pitchFamily="49" charset="0"/>
+                <a:cs typeface="Times New Roman" panose="02020603050405020304" pitchFamily="18" charset="0"/>
+              </a:rPr>
+              <a:t>while(coffee.notEmpty()) </a:t>
+            </a:r>
+            <a:r>
+              <a:rPr lang="sr-Latn-RS" dirty="0">
+                <a:solidFill>
+                  <a:srgbClr val="43FF47"/>
+                </a:solidFill>
+                <a:latin typeface="Consolas" panose="020B0609020204030204" pitchFamily="49" charset="0"/>
+                <a:cs typeface="Times New Roman" panose="02020603050405020304" pitchFamily="18" charset="0"/>
+              </a:rPr>
+              <a:t>{</a:t>
+            </a:r>
+          </a:p>
+        </p:txBody>
+      </p:sp>
+      <p:sp>
+        <p:nvSpPr>
+          <p:cNvPr id="4" name="TextBox 3">
+            <a:extLst>
+              <a:ext uri="{FF2B5EF4-FFF2-40B4-BE49-F238E27FC236}">
+                <a16:creationId xmlns:a16="http://schemas.microsoft.com/office/drawing/2014/main" id="{560ADE74-F2D7-D2C4-EA05-F61FA097583A}"/>
+              </a:ext>
+            </a:extLst>
+          </p:cNvPr>
+          <p:cNvSpPr txBox="1"/>
+          <p:nvPr/>
+        </p:nvSpPr>
+        <p:spPr>
+          <a:xfrm>
+            <a:off x="932007" y="5797339"/>
+            <a:ext cx="10522734" cy="369332"/>
+          </a:xfrm>
+          <a:prstGeom prst="rect">
+            <a:avLst/>
+          </a:prstGeom>
+          <a:noFill/>
+        </p:spPr>
+        <p:txBody>
+          <a:bodyPr wrap="square" rtlCol="0">
+            <a:spAutoFit/>
+          </a:bodyPr>
+          <a:lstStyle/>
+          <a:p>
+            <a:r>
+              <a:rPr lang="sr-Latn-RS" dirty="0">
+                <a:solidFill>
+                  <a:srgbClr val="43FF47"/>
+                </a:solidFill>
+                <a:latin typeface="Consolas" panose="020B0609020204030204" pitchFamily="49" charset="0"/>
+                <a:cs typeface="Times New Roman" panose="02020603050405020304" pitchFamily="18" charset="0"/>
+              </a:rPr>
+              <a:t>}</a:t>
+            </a:r>
+          </a:p>
+        </p:txBody>
+      </p:sp>
+      <p:sp>
+        <p:nvSpPr>
+          <p:cNvPr id="7" name="TextBox 6">
+            <a:extLst>
+              <a:ext uri="{FF2B5EF4-FFF2-40B4-BE49-F238E27FC236}">
+                <a16:creationId xmlns:a16="http://schemas.microsoft.com/office/drawing/2014/main" id="{503870F7-8D19-A8B9-C691-72A32991E99D}"/>
+              </a:ext>
+            </a:extLst>
+          </p:cNvPr>
+          <p:cNvSpPr txBox="1"/>
+          <p:nvPr/>
+        </p:nvSpPr>
+        <p:spPr>
+          <a:xfrm>
+            <a:off x="932007" y="1704821"/>
+            <a:ext cx="10522734" cy="369332"/>
+          </a:xfrm>
+          <a:prstGeom prst="rect">
+            <a:avLst/>
+          </a:prstGeom>
+          <a:noFill/>
+        </p:spPr>
+        <p:txBody>
+          <a:bodyPr wrap="square" rtlCol="0">
+            <a:spAutoFit/>
+          </a:bodyPr>
+          <a:lstStyle/>
+          <a:p>
+            <a:r>
+              <a:rPr lang="sr-Latn-RS" dirty="0">
+                <a:solidFill>
+                  <a:srgbClr val="43FF47"/>
+                </a:solidFill>
+                <a:latin typeface="Consolas" panose="020B0609020204030204" pitchFamily="49" charset="0"/>
+                <a:cs typeface="Times New Roman" panose="02020603050405020304" pitchFamily="18" charset="0"/>
+              </a:rPr>
+              <a:t>	code, code, code</a:t>
+            </a:r>
+          </a:p>
+        </p:txBody>
+      </p:sp>
+      <p:sp>
+        <p:nvSpPr>
+          <p:cNvPr id="8" name="TextBox 7">
+            <a:extLst>
+              <a:ext uri="{FF2B5EF4-FFF2-40B4-BE49-F238E27FC236}">
+                <a16:creationId xmlns:a16="http://schemas.microsoft.com/office/drawing/2014/main" id="{D3D02DCE-5998-916D-D49F-7A0671053F6B}"/>
+              </a:ext>
+            </a:extLst>
+          </p:cNvPr>
+          <p:cNvSpPr txBox="1"/>
+          <p:nvPr/>
+        </p:nvSpPr>
+        <p:spPr>
+          <a:xfrm>
+            <a:off x="932007" y="2110742"/>
+            <a:ext cx="10522734" cy="369332"/>
+          </a:xfrm>
+          <a:prstGeom prst="rect">
+            <a:avLst/>
+          </a:prstGeom>
+          <a:noFill/>
+        </p:spPr>
+        <p:txBody>
+          <a:bodyPr wrap="square" rtlCol="0">
+            <a:spAutoFit/>
+          </a:bodyPr>
+          <a:lstStyle/>
+          <a:p>
+            <a:r>
+              <a:rPr lang="sr-Latn-RS" dirty="0">
+                <a:solidFill>
+                  <a:srgbClr val="43FF47"/>
+                </a:solidFill>
+                <a:latin typeface="Consolas" panose="020B0609020204030204" pitchFamily="49" charset="0"/>
+                <a:cs typeface="Times New Roman" panose="02020603050405020304" pitchFamily="18" charset="0"/>
+              </a:rPr>
+              <a:t>	if(test_your_code() == OK) {</a:t>
+            </a:r>
+          </a:p>
+        </p:txBody>
+      </p:sp>
+      <p:sp>
+        <p:nvSpPr>
+          <p:cNvPr id="10" name="TextBox 9">
+            <a:extLst>
+              <a:ext uri="{FF2B5EF4-FFF2-40B4-BE49-F238E27FC236}">
+                <a16:creationId xmlns:a16="http://schemas.microsoft.com/office/drawing/2014/main" id="{1DE92725-A737-E7D9-B1DA-8C0B3B13B0DB}"/>
+              </a:ext>
+            </a:extLst>
+          </p:cNvPr>
+          <p:cNvSpPr txBox="1"/>
+          <p:nvPr/>
+        </p:nvSpPr>
+        <p:spPr>
+          <a:xfrm>
+            <a:off x="932007" y="2526318"/>
+            <a:ext cx="10522734" cy="923330"/>
+          </a:xfrm>
+          <a:prstGeom prst="rect">
+            <a:avLst/>
+          </a:prstGeom>
+          <a:noFill/>
+        </p:spPr>
+        <p:txBody>
+          <a:bodyPr wrap="square" rtlCol="0">
+            <a:spAutoFit/>
+          </a:bodyPr>
+          <a:lstStyle/>
+          <a:p>
+            <a:r>
+              <a:rPr lang="sr-Latn-RS" dirty="0">
+                <a:solidFill>
+                  <a:srgbClr val="43FF47"/>
+                </a:solidFill>
+                <a:latin typeface="Consolas" panose="020B0609020204030204" pitchFamily="49" charset="0"/>
+                <a:cs typeface="Times New Roman" panose="02020603050405020304" pitchFamily="18" charset="0"/>
+              </a:rPr>
+              <a:t>		</a:t>
+            </a:r>
+          </a:p>
+          <a:p>
+            <a:r>
+              <a:rPr lang="sr-Latn-RS" dirty="0">
+                <a:solidFill>
+                  <a:srgbClr val="43FF47"/>
+                </a:solidFill>
+                <a:latin typeface="Consolas" panose="020B0609020204030204" pitchFamily="49" charset="0"/>
+                <a:cs typeface="Times New Roman" panose="02020603050405020304" pitchFamily="18" charset="0"/>
+              </a:rPr>
+              <a:t>		// great </a:t>
+            </a:r>
+          </a:p>
+          <a:p>
+            <a:endParaRPr lang="sr-Latn-RS" dirty="0">
+              <a:solidFill>
+                <a:srgbClr val="43FF47"/>
+              </a:solidFill>
+              <a:latin typeface="Consolas" panose="020B0609020204030204" pitchFamily="49" charset="0"/>
+              <a:cs typeface="Times New Roman" panose="02020603050405020304" pitchFamily="18" charset="0"/>
+            </a:endParaRPr>
+          </a:p>
+        </p:txBody>
+      </p:sp>
+      <p:sp>
+        <p:nvSpPr>
+          <p:cNvPr id="29" name="TextBox 28">
+            <a:extLst>
+              <a:ext uri="{FF2B5EF4-FFF2-40B4-BE49-F238E27FC236}">
+                <a16:creationId xmlns:a16="http://schemas.microsoft.com/office/drawing/2014/main" id="{266062DC-2AA5-1D5D-B67B-BB1E8F36C257}"/>
+              </a:ext>
+            </a:extLst>
+          </p:cNvPr>
+          <p:cNvSpPr txBox="1"/>
+          <p:nvPr/>
+        </p:nvSpPr>
+        <p:spPr>
+          <a:xfrm>
+            <a:off x="932007" y="3511634"/>
+            <a:ext cx="10522734" cy="369332"/>
+          </a:xfrm>
+          <a:prstGeom prst="rect">
+            <a:avLst/>
+          </a:prstGeom>
+          <a:noFill/>
+        </p:spPr>
+        <p:txBody>
+          <a:bodyPr wrap="square" rtlCol="0">
+            <a:spAutoFit/>
+          </a:bodyPr>
+          <a:lstStyle/>
+          <a:p>
+            <a:r>
+              <a:rPr lang="sr-Latn-RS" dirty="0">
+                <a:solidFill>
+                  <a:srgbClr val="43FF47"/>
+                </a:solidFill>
+                <a:latin typeface="Consolas" panose="020B0609020204030204" pitchFamily="49" charset="0"/>
+                <a:cs typeface="Times New Roman" panose="02020603050405020304" pitchFamily="18" charset="0"/>
+              </a:rPr>
+              <a:t>	} </a:t>
+            </a:r>
+          </a:p>
+        </p:txBody>
+      </p:sp>
+      <p:pic>
+        <p:nvPicPr>
+          <p:cNvPr id="31" name="Picture 30">
+            <a:extLst>
+              <a:ext uri="{FF2B5EF4-FFF2-40B4-BE49-F238E27FC236}">
+                <a16:creationId xmlns:a16="http://schemas.microsoft.com/office/drawing/2014/main" id="{9102A966-CD2F-25D3-3AC3-8CDBDFE60A0C}"/>
+              </a:ext>
+            </a:extLst>
+          </p:cNvPr>
+          <p:cNvPicPr>
+            <a:picLocks noChangeAspect="1"/>
+          </p:cNvPicPr>
+          <p:nvPr/>
+        </p:nvPicPr>
+        <p:blipFill>
+          <a:blip r:embed="rId9">
+            <a:extLst>
+              <a:ext uri="{28A0092B-C50C-407E-A947-70E740481C1C}">
+                <a14:useLocalDpi xmlns:a14="http://schemas.microsoft.com/office/drawing/2010/main" val="0"/>
+              </a:ext>
+            </a:extLst>
+          </a:blip>
+          <a:stretch>
+            <a:fillRect/>
+          </a:stretch>
+        </p:blipFill>
+        <p:spPr>
+          <a:xfrm>
+            <a:off x="6090939" y="2295408"/>
+            <a:ext cx="1731829" cy="1298872"/>
+          </a:xfrm>
+          <a:prstGeom prst="roundRect">
+            <a:avLst>
+              <a:gd name="adj" fmla="val 8594"/>
+            </a:avLst>
+          </a:prstGeom>
+          <a:solidFill>
+            <a:srgbClr val="FFFFFF">
+              <a:shade val="85000"/>
+            </a:srgbClr>
+          </a:solidFill>
+          <a:ln>
+            <a:noFill/>
+          </a:ln>
+          <a:effectLst/>
         </p:spPr>
       </p:pic>
     </p:spTree>

</xml_diff>

<commit_message>
Engleski prezentacija Version control tab
</commit_message>
<xml_diff>
--- a/I_godina/I_semestar/Engleski/Prezentacija/Presentation.pptx
+++ b/I_godina/I_semestar/Engleski/Prezentacija/Presentation.pptx
@@ -267,7 +267,7 @@
           <a:p>
             <a:fld id="{1F7A9E03-690E-441B-BA3B-1CC4C89A0BEF}" type="datetimeFigureOut">
               <a:rPr lang="sr-Latn-RS" smtClean="0"/>
-              <a:t>6.12.2023.</a:t>
+              <a:t>13.12.2023.</a:t>
             </a:fld>
             <a:endParaRPr lang="sr-Latn-RS"/>
           </a:p>
@@ -467,7 +467,7 @@
           <a:p>
             <a:fld id="{1F7A9E03-690E-441B-BA3B-1CC4C89A0BEF}" type="datetimeFigureOut">
               <a:rPr lang="sr-Latn-RS" smtClean="0"/>
-              <a:t>6.12.2023.</a:t>
+              <a:t>13.12.2023.</a:t>
             </a:fld>
             <a:endParaRPr lang="sr-Latn-RS"/>
           </a:p>
@@ -677,7 +677,7 @@
           <a:p>
             <a:fld id="{1F7A9E03-690E-441B-BA3B-1CC4C89A0BEF}" type="datetimeFigureOut">
               <a:rPr lang="sr-Latn-RS" smtClean="0"/>
-              <a:t>6.12.2023.</a:t>
+              <a:t>13.12.2023.</a:t>
             </a:fld>
             <a:endParaRPr lang="sr-Latn-RS"/>
           </a:p>
@@ -877,7 +877,7 @@
           <a:p>
             <a:fld id="{1F7A9E03-690E-441B-BA3B-1CC4C89A0BEF}" type="datetimeFigureOut">
               <a:rPr lang="sr-Latn-RS" smtClean="0"/>
-              <a:t>6.12.2023.</a:t>
+              <a:t>13.12.2023.</a:t>
             </a:fld>
             <a:endParaRPr lang="sr-Latn-RS"/>
           </a:p>
@@ -1153,7 +1153,7 @@
           <a:p>
             <a:fld id="{1F7A9E03-690E-441B-BA3B-1CC4C89A0BEF}" type="datetimeFigureOut">
               <a:rPr lang="sr-Latn-RS" smtClean="0"/>
-              <a:t>6.12.2023.</a:t>
+              <a:t>13.12.2023.</a:t>
             </a:fld>
             <a:endParaRPr lang="sr-Latn-RS"/>
           </a:p>
@@ -1421,7 +1421,7 @@
           <a:p>
             <a:fld id="{1F7A9E03-690E-441B-BA3B-1CC4C89A0BEF}" type="datetimeFigureOut">
               <a:rPr lang="sr-Latn-RS" smtClean="0"/>
-              <a:t>6.12.2023.</a:t>
+              <a:t>13.12.2023.</a:t>
             </a:fld>
             <a:endParaRPr lang="sr-Latn-RS"/>
           </a:p>
@@ -1836,7 +1836,7 @@
           <a:p>
             <a:fld id="{1F7A9E03-690E-441B-BA3B-1CC4C89A0BEF}" type="datetimeFigureOut">
               <a:rPr lang="sr-Latn-RS" smtClean="0"/>
-              <a:t>6.12.2023.</a:t>
+              <a:t>13.12.2023.</a:t>
             </a:fld>
             <a:endParaRPr lang="sr-Latn-RS"/>
           </a:p>
@@ -1978,7 +1978,7 @@
           <a:p>
             <a:fld id="{1F7A9E03-690E-441B-BA3B-1CC4C89A0BEF}" type="datetimeFigureOut">
               <a:rPr lang="sr-Latn-RS" smtClean="0"/>
-              <a:t>6.12.2023.</a:t>
+              <a:t>13.12.2023.</a:t>
             </a:fld>
             <a:endParaRPr lang="sr-Latn-RS"/>
           </a:p>
@@ -2091,7 +2091,7 @@
           <a:p>
             <a:fld id="{1F7A9E03-690E-441B-BA3B-1CC4C89A0BEF}" type="datetimeFigureOut">
               <a:rPr lang="sr-Latn-RS" smtClean="0"/>
-              <a:t>6.12.2023.</a:t>
+              <a:t>13.12.2023.</a:t>
             </a:fld>
             <a:endParaRPr lang="sr-Latn-RS"/>
           </a:p>
@@ -2404,7 +2404,7 @@
           <a:p>
             <a:fld id="{1F7A9E03-690E-441B-BA3B-1CC4C89A0BEF}" type="datetimeFigureOut">
               <a:rPr lang="sr-Latn-RS" smtClean="0"/>
-              <a:t>6.12.2023.</a:t>
+              <a:t>13.12.2023.</a:t>
             </a:fld>
             <a:endParaRPr lang="sr-Latn-RS"/>
           </a:p>
@@ -2693,7 +2693,7 @@
           <a:p>
             <a:fld id="{1F7A9E03-690E-441B-BA3B-1CC4C89A0BEF}" type="datetimeFigureOut">
               <a:rPr lang="sr-Latn-RS" smtClean="0"/>
-              <a:t>6.12.2023.</a:t>
+              <a:t>13.12.2023.</a:t>
             </a:fld>
             <a:endParaRPr lang="sr-Latn-RS"/>
           </a:p>
@@ -2936,7 +2936,7 @@
           <a:p>
             <a:fld id="{1F7A9E03-690E-441B-BA3B-1CC4C89A0BEF}" type="datetimeFigureOut">
               <a:rPr lang="sr-Latn-RS" smtClean="0"/>
-              <a:t>6.12.2023.</a:t>
+              <a:t>13.12.2023.</a:t>
             </a:fld>
             <a:endParaRPr lang="sr-Latn-RS"/>
           </a:p>
@@ -9727,10 +9727,10 @@
       </p:pic>
       <p:sp>
         <p:nvSpPr>
-          <p:cNvPr id="2" name="TextBox 1">
-            <a:extLst>
-              <a:ext uri="{FF2B5EF4-FFF2-40B4-BE49-F238E27FC236}">
-                <a16:creationId xmlns:a16="http://schemas.microsoft.com/office/drawing/2014/main" id="{BAEF1267-E68E-B8C9-21D7-D84D13FCCF54}"/>
+          <p:cNvPr id="3" name="TextBox 2">
+            <a:extLst>
+              <a:ext uri="{FF2B5EF4-FFF2-40B4-BE49-F238E27FC236}">
+                <a16:creationId xmlns:a16="http://schemas.microsoft.com/office/drawing/2014/main" id="{21BB8247-CCB3-D3A3-95A7-1CB65ED2BA3F}"/>
               </a:ext>
             </a:extLst>
           </p:cNvPr>
@@ -9739,8 +9739,8 @@
         </p:nvSpPr>
         <p:spPr>
           <a:xfrm>
-            <a:off x="932007" y="817594"/>
-            <a:ext cx="10522734" cy="369332"/>
+            <a:off x="937068" y="673723"/>
+            <a:ext cx="10522734" cy="5909310"/>
           </a:xfrm>
           <a:prstGeom prst="rect">
             <a:avLst/>
@@ -9761,234 +9761,7 @@
                 <a:latin typeface="Consolas" panose="020B0609020204030204" pitchFamily="49" charset="0"/>
                 <a:cs typeface="Times New Roman" panose="02020603050405020304" pitchFamily="18" charset="0"/>
               </a:rPr>
-              <a:t>.</a:t>
-            </a:r>
-          </a:p>
-        </p:txBody>
-      </p:sp>
-      <p:sp>
-        <p:nvSpPr>
-          <p:cNvPr id="3" name="TextBox 2">
-            <a:extLst>
-              <a:ext uri="{FF2B5EF4-FFF2-40B4-BE49-F238E27FC236}">
-                <a16:creationId xmlns:a16="http://schemas.microsoft.com/office/drawing/2014/main" id="{21BB8247-CCB3-D3A3-95A7-1CB65ED2BA3F}"/>
-              </a:ext>
-            </a:extLst>
-          </p:cNvPr>
-          <p:cNvSpPr txBox="1"/>
-          <p:nvPr/>
-        </p:nvSpPr>
-        <p:spPr>
-          <a:xfrm>
-            <a:off x="932007" y="1302208"/>
-            <a:ext cx="10522734" cy="369332"/>
-          </a:xfrm>
-          <a:prstGeom prst="rect">
-            <a:avLst/>
-          </a:prstGeom>
-          <a:noFill/>
-        </p:spPr>
-        <p:txBody>
-          <a:bodyPr wrap="square" rtlCol="0">
-            <a:spAutoFit/>
-          </a:bodyPr>
-          <a:lstStyle/>
-          <a:p>
-            <a:r>
-              <a:rPr lang="sr-Latn-RS">
-                <a:solidFill>
-                  <a:srgbClr val="43FF47"/>
-                </a:solidFill>
-                <a:latin typeface="Consolas" panose="020B0609020204030204" pitchFamily="49" charset="0"/>
-                <a:cs typeface="Times New Roman" panose="02020603050405020304" pitchFamily="18" charset="0"/>
-              </a:rPr>
-              <a:t>while(coffee.notEmpty()) </a:t>
-            </a:r>
-            <a:r>
-              <a:rPr lang="sr-Latn-RS" dirty="0">
-                <a:solidFill>
-                  <a:srgbClr val="43FF47"/>
-                </a:solidFill>
-                <a:latin typeface="Consolas" panose="020B0609020204030204" pitchFamily="49" charset="0"/>
-                <a:cs typeface="Times New Roman" panose="02020603050405020304" pitchFamily="18" charset="0"/>
-              </a:rPr>
-              <a:t>{</a:t>
-            </a:r>
-          </a:p>
-        </p:txBody>
-      </p:sp>
-      <p:sp>
-        <p:nvSpPr>
-          <p:cNvPr id="4" name="TextBox 3">
-            <a:extLst>
-              <a:ext uri="{FF2B5EF4-FFF2-40B4-BE49-F238E27FC236}">
-                <a16:creationId xmlns:a16="http://schemas.microsoft.com/office/drawing/2014/main" id="{560ADE74-F2D7-D2C4-EA05-F61FA097583A}"/>
-              </a:ext>
-            </a:extLst>
-          </p:cNvPr>
-          <p:cNvSpPr txBox="1"/>
-          <p:nvPr/>
-        </p:nvSpPr>
-        <p:spPr>
-          <a:xfrm>
-            <a:off x="932007" y="5797339"/>
-            <a:ext cx="10522734" cy="369332"/>
-          </a:xfrm>
-          <a:prstGeom prst="rect">
-            <a:avLst/>
-          </a:prstGeom>
-          <a:noFill/>
-        </p:spPr>
-        <p:txBody>
-          <a:bodyPr wrap="square" rtlCol="0">
-            <a:spAutoFit/>
-          </a:bodyPr>
-          <a:lstStyle/>
-          <a:p>
-            <a:r>
-              <a:rPr lang="sr-Latn-RS" dirty="0">
-                <a:solidFill>
-                  <a:srgbClr val="43FF47"/>
-                </a:solidFill>
-                <a:latin typeface="Consolas" panose="020B0609020204030204" pitchFamily="49" charset="0"/>
-                <a:cs typeface="Times New Roman" panose="02020603050405020304" pitchFamily="18" charset="0"/>
-              </a:rPr>
-              <a:t>}</a:t>
-            </a:r>
-          </a:p>
-        </p:txBody>
-      </p:sp>
-      <p:sp>
-        <p:nvSpPr>
-          <p:cNvPr id="7" name="TextBox 6">
-            <a:extLst>
-              <a:ext uri="{FF2B5EF4-FFF2-40B4-BE49-F238E27FC236}">
-                <a16:creationId xmlns:a16="http://schemas.microsoft.com/office/drawing/2014/main" id="{503870F7-8D19-A8B9-C691-72A32991E99D}"/>
-              </a:ext>
-            </a:extLst>
-          </p:cNvPr>
-          <p:cNvSpPr txBox="1"/>
-          <p:nvPr/>
-        </p:nvSpPr>
-        <p:spPr>
-          <a:xfrm>
-            <a:off x="932007" y="1704821"/>
-            <a:ext cx="10522734" cy="369332"/>
-          </a:xfrm>
-          <a:prstGeom prst="rect">
-            <a:avLst/>
-          </a:prstGeom>
-          <a:noFill/>
-        </p:spPr>
-        <p:txBody>
-          <a:bodyPr wrap="square" rtlCol="0">
-            <a:spAutoFit/>
-          </a:bodyPr>
-          <a:lstStyle/>
-          <a:p>
-            <a:r>
-              <a:rPr lang="sr-Latn-RS" dirty="0">
-                <a:solidFill>
-                  <a:srgbClr val="43FF47"/>
-                </a:solidFill>
-                <a:latin typeface="Consolas" panose="020B0609020204030204" pitchFamily="49" charset="0"/>
-                <a:cs typeface="Times New Roman" panose="02020603050405020304" pitchFamily="18" charset="0"/>
-              </a:rPr>
-              <a:t>	code, code, code</a:t>
-            </a:r>
-          </a:p>
-        </p:txBody>
-      </p:sp>
-      <p:sp>
-        <p:nvSpPr>
-          <p:cNvPr id="8" name="TextBox 7">
-            <a:extLst>
-              <a:ext uri="{FF2B5EF4-FFF2-40B4-BE49-F238E27FC236}">
-                <a16:creationId xmlns:a16="http://schemas.microsoft.com/office/drawing/2014/main" id="{D3D02DCE-5998-916D-D49F-7A0671053F6B}"/>
-              </a:ext>
-            </a:extLst>
-          </p:cNvPr>
-          <p:cNvSpPr txBox="1"/>
-          <p:nvPr/>
-        </p:nvSpPr>
-        <p:spPr>
-          <a:xfrm>
-            <a:off x="932007" y="2110742"/>
-            <a:ext cx="10522734" cy="369332"/>
-          </a:xfrm>
-          <a:prstGeom prst="rect">
-            <a:avLst/>
-          </a:prstGeom>
-          <a:noFill/>
-        </p:spPr>
-        <p:txBody>
-          <a:bodyPr wrap="square" rtlCol="0">
-            <a:spAutoFit/>
-          </a:bodyPr>
-          <a:lstStyle/>
-          <a:p>
-            <a:r>
-              <a:rPr lang="sr-Latn-RS" dirty="0">
-                <a:solidFill>
-                  <a:srgbClr val="43FF47"/>
-                </a:solidFill>
-                <a:latin typeface="Consolas" panose="020B0609020204030204" pitchFamily="49" charset="0"/>
-                <a:cs typeface="Times New Roman" panose="02020603050405020304" pitchFamily="18" charset="0"/>
-              </a:rPr>
-              <a:t>	if(test_your_code() == OK) {</a:t>
-            </a:r>
-          </a:p>
-        </p:txBody>
-      </p:sp>
-      <p:sp>
-        <p:nvSpPr>
-          <p:cNvPr id="10" name="TextBox 9">
-            <a:extLst>
-              <a:ext uri="{FF2B5EF4-FFF2-40B4-BE49-F238E27FC236}">
-                <a16:creationId xmlns:a16="http://schemas.microsoft.com/office/drawing/2014/main" id="{1DE92725-A737-E7D9-B1DA-8C0B3B13B0DB}"/>
-              </a:ext>
-            </a:extLst>
-          </p:cNvPr>
-          <p:cNvSpPr txBox="1"/>
-          <p:nvPr/>
-        </p:nvSpPr>
-        <p:spPr>
-          <a:xfrm>
-            <a:off x="932007" y="2526318"/>
-            <a:ext cx="10522734" cy="923330"/>
-          </a:xfrm>
-          <a:prstGeom prst="rect">
-            <a:avLst/>
-          </a:prstGeom>
-          <a:noFill/>
-        </p:spPr>
-        <p:txBody>
-          <a:bodyPr wrap="square" rtlCol="0">
-            <a:spAutoFit/>
-          </a:bodyPr>
-          <a:lstStyle/>
-          <a:p>
-            <a:r>
-              <a:rPr lang="sr-Latn-RS" dirty="0">
-                <a:solidFill>
-                  <a:srgbClr val="43FF47"/>
-                </a:solidFill>
-                <a:latin typeface="Consolas" panose="020B0609020204030204" pitchFamily="49" charset="0"/>
-                <a:cs typeface="Times New Roman" panose="02020603050405020304" pitchFamily="18" charset="0"/>
-              </a:rPr>
-              <a:t>		</a:t>
-            </a:r>
-          </a:p>
-          <a:p>
-            <a:r>
-              <a:rPr lang="sr-Latn-RS" dirty="0">
-                <a:solidFill>
-                  <a:srgbClr val="43FF47"/>
-                </a:solidFill>
-                <a:latin typeface="Consolas" panose="020B0609020204030204" pitchFamily="49" charset="0"/>
-                <a:cs typeface="Times New Roman" panose="02020603050405020304" pitchFamily="18" charset="0"/>
-              </a:rPr>
-              <a:t>		// great </a:t>
+              <a:t>while(coffee.notEmpty()) {</a:t>
             </a:r>
           </a:p>
           <a:p>
@@ -10000,14 +9773,188 @@
               <a:cs typeface="Times New Roman" panose="02020603050405020304" pitchFamily="18" charset="0"/>
             </a:endParaRPr>
           </a:p>
-        </p:txBody>
-      </p:sp>
-      <p:sp>
-        <p:nvSpPr>
-          <p:cNvPr id="29" name="TextBox 28">
-            <a:extLst>
-              <a:ext uri="{FF2B5EF4-FFF2-40B4-BE49-F238E27FC236}">
-                <a16:creationId xmlns:a16="http://schemas.microsoft.com/office/drawing/2014/main" id="{266062DC-2AA5-1D5D-B67B-BB1E8F36C257}"/>
+          <a:p>
+            <a:endParaRPr lang="sr-Latn-RS" dirty="0">
+              <a:solidFill>
+                <a:srgbClr val="43FF47"/>
+              </a:solidFill>
+              <a:latin typeface="Consolas" panose="020B0609020204030204" pitchFamily="49" charset="0"/>
+              <a:cs typeface="Times New Roman" panose="02020603050405020304" pitchFamily="18" charset="0"/>
+            </a:endParaRPr>
+          </a:p>
+          <a:p>
+            <a:endParaRPr lang="sr-Latn-RS" dirty="0">
+              <a:solidFill>
+                <a:srgbClr val="43FF47"/>
+              </a:solidFill>
+              <a:latin typeface="Consolas" panose="020B0609020204030204" pitchFamily="49" charset="0"/>
+              <a:cs typeface="Times New Roman" panose="02020603050405020304" pitchFamily="18" charset="0"/>
+            </a:endParaRPr>
+          </a:p>
+          <a:p>
+            <a:endParaRPr lang="sr-Latn-RS" dirty="0">
+              <a:solidFill>
+                <a:srgbClr val="43FF47"/>
+              </a:solidFill>
+              <a:latin typeface="Consolas" panose="020B0609020204030204" pitchFamily="49" charset="0"/>
+              <a:cs typeface="Times New Roman" panose="02020603050405020304" pitchFamily="18" charset="0"/>
+            </a:endParaRPr>
+          </a:p>
+          <a:p>
+            <a:endParaRPr lang="sr-Latn-RS" dirty="0">
+              <a:solidFill>
+                <a:srgbClr val="43FF47"/>
+              </a:solidFill>
+              <a:latin typeface="Consolas" panose="020B0609020204030204" pitchFamily="49" charset="0"/>
+              <a:cs typeface="Times New Roman" panose="02020603050405020304" pitchFamily="18" charset="0"/>
+            </a:endParaRPr>
+          </a:p>
+          <a:p>
+            <a:endParaRPr lang="sr-Latn-RS" dirty="0">
+              <a:solidFill>
+                <a:srgbClr val="43FF47"/>
+              </a:solidFill>
+              <a:latin typeface="Consolas" panose="020B0609020204030204" pitchFamily="49" charset="0"/>
+              <a:cs typeface="Times New Roman" panose="02020603050405020304" pitchFamily="18" charset="0"/>
+            </a:endParaRPr>
+          </a:p>
+          <a:p>
+            <a:endParaRPr lang="sr-Latn-RS" dirty="0">
+              <a:solidFill>
+                <a:srgbClr val="43FF47"/>
+              </a:solidFill>
+              <a:latin typeface="Consolas" panose="020B0609020204030204" pitchFamily="49" charset="0"/>
+              <a:cs typeface="Times New Roman" panose="02020603050405020304" pitchFamily="18" charset="0"/>
+            </a:endParaRPr>
+          </a:p>
+          <a:p>
+            <a:endParaRPr lang="sr-Latn-RS" dirty="0">
+              <a:solidFill>
+                <a:srgbClr val="43FF47"/>
+              </a:solidFill>
+              <a:latin typeface="Consolas" panose="020B0609020204030204" pitchFamily="49" charset="0"/>
+              <a:cs typeface="Times New Roman" panose="02020603050405020304" pitchFamily="18" charset="0"/>
+            </a:endParaRPr>
+          </a:p>
+          <a:p>
+            <a:endParaRPr lang="sr-Latn-RS" dirty="0">
+              <a:solidFill>
+                <a:srgbClr val="43FF47"/>
+              </a:solidFill>
+              <a:latin typeface="Consolas" panose="020B0609020204030204" pitchFamily="49" charset="0"/>
+              <a:cs typeface="Times New Roman" panose="02020603050405020304" pitchFamily="18" charset="0"/>
+            </a:endParaRPr>
+          </a:p>
+          <a:p>
+            <a:endParaRPr lang="sr-Latn-RS" dirty="0">
+              <a:solidFill>
+                <a:srgbClr val="43FF47"/>
+              </a:solidFill>
+              <a:latin typeface="Consolas" panose="020B0609020204030204" pitchFamily="49" charset="0"/>
+              <a:cs typeface="Times New Roman" panose="02020603050405020304" pitchFamily="18" charset="0"/>
+            </a:endParaRPr>
+          </a:p>
+          <a:p>
+            <a:endParaRPr lang="sr-Latn-RS" dirty="0">
+              <a:solidFill>
+                <a:srgbClr val="43FF47"/>
+              </a:solidFill>
+              <a:latin typeface="Consolas" panose="020B0609020204030204" pitchFamily="49" charset="0"/>
+              <a:cs typeface="Times New Roman" panose="02020603050405020304" pitchFamily="18" charset="0"/>
+            </a:endParaRPr>
+          </a:p>
+          <a:p>
+            <a:endParaRPr lang="sr-Latn-RS" dirty="0">
+              <a:solidFill>
+                <a:srgbClr val="43FF47"/>
+              </a:solidFill>
+              <a:latin typeface="Consolas" panose="020B0609020204030204" pitchFamily="49" charset="0"/>
+              <a:cs typeface="Times New Roman" panose="02020603050405020304" pitchFamily="18" charset="0"/>
+            </a:endParaRPr>
+          </a:p>
+          <a:p>
+            <a:endParaRPr lang="sr-Latn-RS" dirty="0">
+              <a:solidFill>
+                <a:srgbClr val="43FF47"/>
+              </a:solidFill>
+              <a:latin typeface="Consolas" panose="020B0609020204030204" pitchFamily="49" charset="0"/>
+              <a:cs typeface="Times New Roman" panose="02020603050405020304" pitchFamily="18" charset="0"/>
+            </a:endParaRPr>
+          </a:p>
+          <a:p>
+            <a:endParaRPr lang="sr-Latn-RS" dirty="0">
+              <a:solidFill>
+                <a:srgbClr val="43FF47"/>
+              </a:solidFill>
+              <a:latin typeface="Consolas" panose="020B0609020204030204" pitchFamily="49" charset="0"/>
+              <a:cs typeface="Times New Roman" panose="02020603050405020304" pitchFamily="18" charset="0"/>
+            </a:endParaRPr>
+          </a:p>
+          <a:p>
+            <a:endParaRPr lang="sr-Latn-RS" dirty="0">
+              <a:solidFill>
+                <a:srgbClr val="43FF47"/>
+              </a:solidFill>
+              <a:latin typeface="Consolas" panose="020B0609020204030204" pitchFamily="49" charset="0"/>
+              <a:cs typeface="Times New Roman" panose="02020603050405020304" pitchFamily="18" charset="0"/>
+            </a:endParaRPr>
+          </a:p>
+          <a:p>
+            <a:endParaRPr lang="sr-Latn-RS" dirty="0">
+              <a:solidFill>
+                <a:srgbClr val="43FF47"/>
+              </a:solidFill>
+              <a:latin typeface="Consolas" panose="020B0609020204030204" pitchFamily="49" charset="0"/>
+              <a:cs typeface="Times New Roman" panose="02020603050405020304" pitchFamily="18" charset="0"/>
+            </a:endParaRPr>
+          </a:p>
+          <a:p>
+            <a:endParaRPr lang="sr-Latn-RS" dirty="0">
+              <a:solidFill>
+                <a:srgbClr val="43FF47"/>
+              </a:solidFill>
+              <a:latin typeface="Consolas" panose="020B0609020204030204" pitchFamily="49" charset="0"/>
+              <a:cs typeface="Times New Roman" panose="02020603050405020304" pitchFamily="18" charset="0"/>
+            </a:endParaRPr>
+          </a:p>
+          <a:p>
+            <a:endParaRPr lang="sr-Latn-RS" dirty="0">
+              <a:solidFill>
+                <a:srgbClr val="43FF47"/>
+              </a:solidFill>
+              <a:latin typeface="Consolas" panose="020B0609020204030204" pitchFamily="49" charset="0"/>
+              <a:cs typeface="Times New Roman" panose="02020603050405020304" pitchFamily="18" charset="0"/>
+            </a:endParaRPr>
+          </a:p>
+          <a:p>
+            <a:endParaRPr lang="sr-Latn-RS" dirty="0">
+              <a:solidFill>
+                <a:srgbClr val="43FF47"/>
+              </a:solidFill>
+              <a:latin typeface="Consolas" panose="020B0609020204030204" pitchFamily="49" charset="0"/>
+              <a:cs typeface="Times New Roman" panose="02020603050405020304" pitchFamily="18" charset="0"/>
+            </a:endParaRPr>
+          </a:p>
+          <a:p>
+            <a:r>
+              <a:rPr lang="sr-Latn-RS" dirty="0">
+                <a:solidFill>
+                  <a:srgbClr val="43FF47"/>
+                </a:solidFill>
+                <a:latin typeface="Consolas" panose="020B0609020204030204" pitchFamily="49" charset="0"/>
+                <a:cs typeface="Times New Roman" panose="02020603050405020304" pitchFamily="18" charset="0"/>
+              </a:rPr>
+              <a:t>}</a:t>
+            </a:r>
+          </a:p>
+        </p:txBody>
+      </p:sp>
+      <p:sp>
+        <p:nvSpPr>
+          <p:cNvPr id="7" name="TextBox 6">
+            <a:extLst>
+              <a:ext uri="{FF2B5EF4-FFF2-40B4-BE49-F238E27FC236}">
+                <a16:creationId xmlns:a16="http://schemas.microsoft.com/office/drawing/2014/main" id="{503870F7-8D19-A8B9-C691-72A32991E99D}"/>
               </a:ext>
             </a:extLst>
           </p:cNvPr>
@@ -10016,7 +9963,7 @@
         </p:nvSpPr>
         <p:spPr>
           <a:xfrm>
-            <a:off x="932007" y="3511634"/>
+            <a:off x="937068" y="1076336"/>
             <a:ext cx="10522734" cy="369332"/>
           </a:xfrm>
           <a:prstGeom prst="rect">
@@ -10038,7 +9985,102 @@
                 <a:latin typeface="Consolas" panose="020B0609020204030204" pitchFamily="49" charset="0"/>
                 <a:cs typeface="Times New Roman" panose="02020603050405020304" pitchFamily="18" charset="0"/>
               </a:rPr>
-              <a:t>	} </a:t>
+              <a:t>	code, code, code</a:t>
+            </a:r>
+          </a:p>
+        </p:txBody>
+      </p:sp>
+      <p:sp>
+        <p:nvSpPr>
+          <p:cNvPr id="8" name="TextBox 7">
+            <a:extLst>
+              <a:ext uri="{FF2B5EF4-FFF2-40B4-BE49-F238E27FC236}">
+                <a16:creationId xmlns:a16="http://schemas.microsoft.com/office/drawing/2014/main" id="{D3D02DCE-5998-916D-D49F-7A0671053F6B}"/>
+              </a:ext>
+            </a:extLst>
+          </p:cNvPr>
+          <p:cNvSpPr txBox="1"/>
+          <p:nvPr/>
+        </p:nvSpPr>
+        <p:spPr>
+          <a:xfrm>
+            <a:off x="937068" y="1482257"/>
+            <a:ext cx="10522734" cy="1754326"/>
+          </a:xfrm>
+          <a:prstGeom prst="rect">
+            <a:avLst/>
+          </a:prstGeom>
+          <a:noFill/>
+        </p:spPr>
+        <p:txBody>
+          <a:bodyPr wrap="square" rtlCol="0">
+            <a:spAutoFit/>
+          </a:bodyPr>
+          <a:lstStyle/>
+          <a:p>
+            <a:r>
+              <a:rPr lang="sr-Latn-RS" dirty="0">
+                <a:solidFill>
+                  <a:srgbClr val="43FF47"/>
+                </a:solidFill>
+                <a:latin typeface="Consolas" panose="020B0609020204030204" pitchFamily="49" charset="0"/>
+                <a:cs typeface="Times New Roman" panose="02020603050405020304" pitchFamily="18" charset="0"/>
+              </a:rPr>
+              <a:t>	if(test_your_code() == OK) {</a:t>
+            </a:r>
+          </a:p>
+          <a:p>
+            <a:endParaRPr lang="sr-Latn-RS" dirty="0">
+              <a:solidFill>
+                <a:srgbClr val="43FF47"/>
+              </a:solidFill>
+              <a:latin typeface="Consolas" panose="020B0609020204030204" pitchFamily="49" charset="0"/>
+              <a:cs typeface="Times New Roman" panose="02020603050405020304" pitchFamily="18" charset="0"/>
+            </a:endParaRPr>
+          </a:p>
+          <a:p>
+            <a:r>
+              <a:rPr lang="sr-Latn-RS" dirty="0">
+                <a:solidFill>
+                  <a:srgbClr val="43FF47"/>
+                </a:solidFill>
+                <a:latin typeface="Consolas" panose="020B0609020204030204" pitchFamily="49" charset="0"/>
+                <a:cs typeface="Times New Roman" panose="02020603050405020304" pitchFamily="18" charset="0"/>
+              </a:rPr>
+              <a:t>		// great </a:t>
+            </a:r>
+          </a:p>
+          <a:p>
+            <a:r>
+              <a:rPr lang="sr-Latn-RS" dirty="0">
+                <a:solidFill>
+                  <a:srgbClr val="43FF47"/>
+                </a:solidFill>
+                <a:latin typeface="Consolas" panose="020B0609020204030204" pitchFamily="49" charset="0"/>
+                <a:cs typeface="Times New Roman" panose="02020603050405020304" pitchFamily="18" charset="0"/>
+              </a:rPr>
+              <a:t>		continue;</a:t>
+            </a:r>
+          </a:p>
+          <a:p>
+            <a:endParaRPr lang="sr-Latn-RS" dirty="0">
+              <a:solidFill>
+                <a:srgbClr val="43FF47"/>
+              </a:solidFill>
+              <a:latin typeface="Consolas" panose="020B0609020204030204" pitchFamily="49" charset="0"/>
+              <a:cs typeface="Times New Roman" panose="02020603050405020304" pitchFamily="18" charset="0"/>
+            </a:endParaRPr>
+          </a:p>
+          <a:p>
+            <a:r>
+              <a:rPr lang="sr-Latn-RS" dirty="0">
+                <a:solidFill>
+                  <a:srgbClr val="43FF47"/>
+                </a:solidFill>
+                <a:latin typeface="Consolas" panose="020B0609020204030204" pitchFamily="49" charset="0"/>
+                <a:cs typeface="Times New Roman" panose="02020603050405020304" pitchFamily="18" charset="0"/>
+              </a:rPr>
+              <a:t>	}</a:t>
             </a:r>
           </a:p>
         </p:txBody>
@@ -10071,8 +10113,8 @@
         </p:blipFill>
         <p:spPr>
           <a:xfrm>
-            <a:off x="6090939" y="2295408"/>
-            <a:ext cx="1731829" cy="1298872"/>
+            <a:off x="5946501" y="1399876"/>
+            <a:ext cx="2363578" cy="1772684"/>
           </a:xfrm>
           <a:prstGeom prst="roundRect">
             <a:avLst>
@@ -10090,6 +10132,526 @@
           <a:effectLst/>
         </p:spPr>
       </p:pic>
+      <p:sp>
+        <p:nvSpPr>
+          <p:cNvPr id="30" name="TextBox 29">
+            <a:extLst>
+              <a:ext uri="{FF2B5EF4-FFF2-40B4-BE49-F238E27FC236}">
+                <a16:creationId xmlns:a16="http://schemas.microsoft.com/office/drawing/2014/main" id="{E8131FD9-44EE-9D8C-F7E1-2F30929C50D2}"/>
+              </a:ext>
+            </a:extLst>
+          </p:cNvPr>
+          <p:cNvSpPr txBox="1"/>
+          <p:nvPr/>
+        </p:nvSpPr>
+        <p:spPr>
+          <a:xfrm>
+            <a:off x="937068" y="3298725"/>
+            <a:ext cx="10522734" cy="2862322"/>
+          </a:xfrm>
+          <a:prstGeom prst="rect">
+            <a:avLst/>
+          </a:prstGeom>
+          <a:noFill/>
+        </p:spPr>
+        <p:txBody>
+          <a:bodyPr wrap="square" rtlCol="0">
+            <a:spAutoFit/>
+          </a:bodyPr>
+          <a:lstStyle/>
+          <a:p>
+            <a:r>
+              <a:rPr lang="sr-Latn-RS" dirty="0">
+                <a:solidFill>
+                  <a:srgbClr val="43FF47"/>
+                </a:solidFill>
+                <a:latin typeface="Consolas" panose="020B0609020204030204" pitchFamily="49" charset="0"/>
+                <a:cs typeface="Times New Roman" panose="02020603050405020304" pitchFamily="18" charset="0"/>
+              </a:rPr>
+              <a:t>	else {</a:t>
+            </a:r>
+          </a:p>
+          <a:p>
+            <a:endParaRPr lang="sr-Latn-RS" dirty="0">
+              <a:solidFill>
+                <a:srgbClr val="43FF47"/>
+              </a:solidFill>
+              <a:latin typeface="Consolas" panose="020B0609020204030204" pitchFamily="49" charset="0"/>
+              <a:cs typeface="Times New Roman" panose="02020603050405020304" pitchFamily="18" charset="0"/>
+            </a:endParaRPr>
+          </a:p>
+          <a:p>
+            <a:endParaRPr lang="sr-Latn-RS" dirty="0">
+              <a:solidFill>
+                <a:srgbClr val="43FF47"/>
+              </a:solidFill>
+              <a:latin typeface="Consolas" panose="020B0609020204030204" pitchFamily="49" charset="0"/>
+              <a:cs typeface="Times New Roman" panose="02020603050405020304" pitchFamily="18" charset="0"/>
+            </a:endParaRPr>
+          </a:p>
+          <a:p>
+            <a:endParaRPr lang="sr-Latn-RS" dirty="0">
+              <a:solidFill>
+                <a:srgbClr val="43FF47"/>
+              </a:solidFill>
+              <a:latin typeface="Consolas" panose="020B0609020204030204" pitchFamily="49" charset="0"/>
+              <a:cs typeface="Times New Roman" panose="02020603050405020304" pitchFamily="18" charset="0"/>
+            </a:endParaRPr>
+          </a:p>
+          <a:p>
+            <a:endParaRPr lang="sr-Latn-RS" dirty="0">
+              <a:solidFill>
+                <a:srgbClr val="43FF47"/>
+              </a:solidFill>
+              <a:latin typeface="Consolas" panose="020B0609020204030204" pitchFamily="49" charset="0"/>
+              <a:cs typeface="Times New Roman" panose="02020603050405020304" pitchFamily="18" charset="0"/>
+            </a:endParaRPr>
+          </a:p>
+          <a:p>
+            <a:endParaRPr lang="sr-Latn-RS" dirty="0">
+              <a:solidFill>
+                <a:srgbClr val="43FF47"/>
+              </a:solidFill>
+              <a:latin typeface="Consolas" panose="020B0609020204030204" pitchFamily="49" charset="0"/>
+              <a:cs typeface="Times New Roman" panose="02020603050405020304" pitchFamily="18" charset="0"/>
+            </a:endParaRPr>
+          </a:p>
+          <a:p>
+            <a:r>
+              <a:rPr lang="sr-Latn-RS" dirty="0">
+                <a:solidFill>
+                  <a:srgbClr val="43FF47"/>
+                </a:solidFill>
+                <a:latin typeface="Consolas" panose="020B0609020204030204" pitchFamily="49" charset="0"/>
+                <a:cs typeface="Times New Roman" panose="02020603050405020304" pitchFamily="18" charset="0"/>
+              </a:rPr>
+              <a:t>	</a:t>
+            </a:r>
+          </a:p>
+          <a:p>
+            <a:endParaRPr lang="sr-Latn-RS" dirty="0">
+              <a:solidFill>
+                <a:srgbClr val="43FF47"/>
+              </a:solidFill>
+              <a:latin typeface="Consolas" panose="020B0609020204030204" pitchFamily="49" charset="0"/>
+              <a:cs typeface="Times New Roman" panose="02020603050405020304" pitchFamily="18" charset="0"/>
+            </a:endParaRPr>
+          </a:p>
+          <a:p>
+            <a:r>
+              <a:rPr lang="sr-Latn-RS" dirty="0">
+                <a:solidFill>
+                  <a:srgbClr val="43FF47"/>
+                </a:solidFill>
+                <a:latin typeface="Consolas" panose="020B0609020204030204" pitchFamily="49" charset="0"/>
+                <a:cs typeface="Times New Roman" panose="02020603050405020304" pitchFamily="18" charset="0"/>
+              </a:rPr>
+              <a:t>	</a:t>
+            </a:r>
+          </a:p>
+          <a:p>
+            <a:r>
+              <a:rPr lang="sr-Latn-RS" dirty="0">
+                <a:solidFill>
+                  <a:srgbClr val="43FF47"/>
+                </a:solidFill>
+                <a:latin typeface="Consolas" panose="020B0609020204030204" pitchFamily="49" charset="0"/>
+                <a:cs typeface="Times New Roman" panose="02020603050405020304" pitchFamily="18" charset="0"/>
+              </a:rPr>
+              <a:t>	}</a:t>
+            </a:r>
+          </a:p>
+        </p:txBody>
+      </p:sp>
+      <p:sp>
+        <p:nvSpPr>
+          <p:cNvPr id="33" name="TextBox 32">
+            <a:extLst>
+              <a:ext uri="{FF2B5EF4-FFF2-40B4-BE49-F238E27FC236}">
+                <a16:creationId xmlns:a16="http://schemas.microsoft.com/office/drawing/2014/main" id="{B4796D7D-BF41-D07C-341D-72CFB215A52E}"/>
+              </a:ext>
+            </a:extLst>
+          </p:cNvPr>
+          <p:cNvSpPr txBox="1"/>
+          <p:nvPr/>
+        </p:nvSpPr>
+        <p:spPr>
+          <a:xfrm>
+            <a:off x="998459" y="3575173"/>
+            <a:ext cx="10522734" cy="1200329"/>
+          </a:xfrm>
+          <a:prstGeom prst="rect">
+            <a:avLst/>
+          </a:prstGeom>
+          <a:noFill/>
+        </p:spPr>
+        <p:txBody>
+          <a:bodyPr wrap="square" rtlCol="0">
+            <a:spAutoFit/>
+          </a:bodyPr>
+          <a:lstStyle/>
+          <a:p>
+            <a:r>
+              <a:rPr lang="sr-Latn-RS" dirty="0">
+                <a:solidFill>
+                  <a:srgbClr val="43FF47"/>
+                </a:solidFill>
+                <a:latin typeface="Consolas" panose="020B0609020204030204" pitchFamily="49" charset="0"/>
+                <a:cs typeface="Times New Roman" panose="02020603050405020304" pitchFamily="18" charset="0"/>
+              </a:rPr>
+              <a:t>		try {</a:t>
+            </a:r>
+          </a:p>
+          <a:p>
+            <a:r>
+              <a:rPr lang="sr-Latn-RS" dirty="0">
+                <a:solidFill>
+                  <a:srgbClr val="43FF47"/>
+                </a:solidFill>
+                <a:latin typeface="Consolas" panose="020B0609020204030204" pitchFamily="49" charset="0"/>
+                <a:cs typeface="Times New Roman" panose="02020603050405020304" pitchFamily="18" charset="0"/>
+              </a:rPr>
+              <a:t>			debuging;</a:t>
+            </a:r>
+          </a:p>
+          <a:p>
+            <a:r>
+              <a:rPr lang="sr-Latn-RS" dirty="0">
+                <a:solidFill>
+                  <a:srgbClr val="43FF47"/>
+                </a:solidFill>
+                <a:latin typeface="Consolas" panose="020B0609020204030204" pitchFamily="49" charset="0"/>
+                <a:cs typeface="Times New Roman" panose="02020603050405020304" pitchFamily="18" charset="0"/>
+              </a:rPr>
+              <a:t>		}</a:t>
+            </a:r>
+          </a:p>
+          <a:p>
+            <a:r>
+              <a:rPr lang="sr-Latn-RS" dirty="0">
+                <a:solidFill>
+                  <a:srgbClr val="43FF47"/>
+                </a:solidFill>
+                <a:latin typeface="Consolas" panose="020B0609020204030204" pitchFamily="49" charset="0"/>
+                <a:cs typeface="Times New Roman" panose="02020603050405020304" pitchFamily="18" charset="0"/>
+              </a:rPr>
+              <a:t>		</a:t>
+            </a:r>
+          </a:p>
+        </p:txBody>
+      </p:sp>
+      <p:sp>
+        <p:nvSpPr>
+          <p:cNvPr id="35" name="TextBox 34">
+            <a:extLst>
+              <a:ext uri="{FF2B5EF4-FFF2-40B4-BE49-F238E27FC236}">
+                <a16:creationId xmlns:a16="http://schemas.microsoft.com/office/drawing/2014/main" id="{525321C0-4AAF-745F-C733-669A66FBDAE8}"/>
+              </a:ext>
+            </a:extLst>
+          </p:cNvPr>
+          <p:cNvSpPr txBox="1"/>
+          <p:nvPr/>
+        </p:nvSpPr>
+        <p:spPr>
+          <a:xfrm>
+            <a:off x="996725" y="4539830"/>
+            <a:ext cx="10522734" cy="1200329"/>
+          </a:xfrm>
+          <a:prstGeom prst="rect">
+            <a:avLst/>
+          </a:prstGeom>
+          <a:noFill/>
+        </p:spPr>
+        <p:txBody>
+          <a:bodyPr wrap="square" rtlCol="0">
+            <a:spAutoFit/>
+          </a:bodyPr>
+          <a:lstStyle/>
+          <a:p>
+            <a:r>
+              <a:rPr lang="sr-Latn-RS" dirty="0">
+                <a:solidFill>
+                  <a:srgbClr val="43FF47"/>
+                </a:solidFill>
+                <a:latin typeface="Consolas" panose="020B0609020204030204" pitchFamily="49" charset="0"/>
+                <a:cs typeface="Times New Roman" panose="02020603050405020304" pitchFamily="18" charset="0"/>
+              </a:rPr>
+              <a:t>		except {</a:t>
+            </a:r>
+          </a:p>
+          <a:p>
+            <a:r>
+              <a:rPr lang="sr-Latn-RS" dirty="0">
+                <a:solidFill>
+                  <a:srgbClr val="43FF47"/>
+                </a:solidFill>
+                <a:latin typeface="Consolas" panose="020B0609020204030204" pitchFamily="49" charset="0"/>
+                <a:cs typeface="Times New Roman" panose="02020603050405020304" pitchFamily="18" charset="0"/>
+              </a:rPr>
+              <a:t>		</a:t>
+            </a:r>
+          </a:p>
+          <a:p>
+            <a:r>
+              <a:rPr lang="sr-Latn-RS" dirty="0">
+                <a:solidFill>
+                  <a:srgbClr val="43FF47"/>
+                </a:solidFill>
+                <a:latin typeface="Consolas" panose="020B0609020204030204" pitchFamily="49" charset="0"/>
+                <a:cs typeface="Times New Roman" panose="02020603050405020304" pitchFamily="18" charset="0"/>
+              </a:rPr>
+              <a:t>			die(☠);</a:t>
+            </a:r>
+          </a:p>
+          <a:p>
+            <a:r>
+              <a:rPr lang="sr-Latn-RS" dirty="0">
+                <a:solidFill>
+                  <a:srgbClr val="43FF47"/>
+                </a:solidFill>
+                <a:latin typeface="Consolas" panose="020B0609020204030204" pitchFamily="49" charset="0"/>
+                <a:cs typeface="Times New Roman" panose="02020603050405020304" pitchFamily="18" charset="0"/>
+              </a:rPr>
+              <a:t>		}</a:t>
+            </a:r>
+          </a:p>
+        </p:txBody>
+      </p:sp>
+      <p:pic>
+        <p:nvPicPr>
+          <p:cNvPr id="38" name="Picture 37">
+            <a:extLst>
+              <a:ext uri="{FF2B5EF4-FFF2-40B4-BE49-F238E27FC236}">
+                <a16:creationId xmlns:a16="http://schemas.microsoft.com/office/drawing/2014/main" id="{5FFC0CC5-D72B-213C-9789-3659560EB9CD}"/>
+              </a:ext>
+            </a:extLst>
+          </p:cNvPr>
+          <p:cNvPicPr>
+            <a:picLocks noChangeAspect="1"/>
+          </p:cNvPicPr>
+          <p:nvPr/>
+        </p:nvPicPr>
+        <p:blipFill>
+          <a:blip r:embed="rId10">
+            <a:extLst>
+              <a:ext uri="{28A0092B-C50C-407E-A947-70E740481C1C}">
+                <a14:useLocalDpi xmlns:a14="http://schemas.microsoft.com/office/drawing/2010/main" val="0"/>
+              </a:ext>
+            </a:extLst>
+          </a:blip>
+          <a:stretch>
+            <a:fillRect/>
+          </a:stretch>
+        </p:blipFill>
+        <p:spPr>
+          <a:xfrm>
+            <a:off x="9088514" y="2994069"/>
+            <a:ext cx="1952521" cy="1772684"/>
+          </a:xfrm>
+          <a:prstGeom prst="roundRect">
+            <a:avLst>
+              <a:gd name="adj" fmla="val 8594"/>
+            </a:avLst>
+          </a:prstGeom>
+          <a:solidFill>
+            <a:srgbClr val="FFFFFF">
+              <a:shade val="85000"/>
+            </a:srgbClr>
+          </a:solidFill>
+          <a:ln>
+            <a:noFill/>
+          </a:ln>
+          <a:effectLst/>
+        </p:spPr>
+      </p:pic>
+      <p:pic>
+        <p:nvPicPr>
+          <p:cNvPr id="40" name="Picture 39">
+            <a:extLst>
+              <a:ext uri="{FF2B5EF4-FFF2-40B4-BE49-F238E27FC236}">
+                <a16:creationId xmlns:a16="http://schemas.microsoft.com/office/drawing/2014/main" id="{A6775D0F-6FBD-91FF-943B-944E7B81FE44}"/>
+              </a:ext>
+            </a:extLst>
+          </p:cNvPr>
+          <p:cNvPicPr>
+            <a:picLocks noChangeAspect="1"/>
+          </p:cNvPicPr>
+          <p:nvPr/>
+        </p:nvPicPr>
+        <p:blipFill rotWithShape="1">
+          <a:blip r:embed="rId11">
+            <a:extLst>
+              <a:ext uri="{28A0092B-C50C-407E-A947-70E740481C1C}">
+                <a14:useLocalDpi xmlns:a14="http://schemas.microsoft.com/office/drawing/2010/main" val="0"/>
+              </a:ext>
+            </a:extLst>
+          </a:blip>
+          <a:srcRect l="10180" r="9784"/>
+          <a:stretch/>
+        </p:blipFill>
+        <p:spPr>
+          <a:xfrm>
+            <a:off x="5946501" y="4556079"/>
+            <a:ext cx="2620910" cy="1667110"/>
+          </a:xfrm>
+          <a:prstGeom prst="roundRect">
+            <a:avLst>
+              <a:gd name="adj" fmla="val 8594"/>
+            </a:avLst>
+          </a:prstGeom>
+          <a:solidFill>
+            <a:srgbClr val="FFFFFF">
+              <a:shade val="85000"/>
+            </a:srgbClr>
+          </a:solidFill>
+          <a:ln>
+            <a:noFill/>
+          </a:ln>
+          <a:effectLst/>
+        </p:spPr>
+      </p:pic>
+      <p:sp>
+        <p:nvSpPr>
+          <p:cNvPr id="44" name="Rectangle 43">
+            <a:extLst>
+              <a:ext uri="{FF2B5EF4-FFF2-40B4-BE49-F238E27FC236}">
+                <a16:creationId xmlns:a16="http://schemas.microsoft.com/office/drawing/2014/main" id="{2884B7C9-4134-9574-2FED-DFF6E1D74AAB}"/>
+              </a:ext>
+            </a:extLst>
+          </p:cNvPr>
+          <p:cNvSpPr/>
+          <p:nvPr/>
+        </p:nvSpPr>
+        <p:spPr>
+          <a:xfrm>
+            <a:off x="-1" y="452164"/>
+            <a:ext cx="12192000" cy="6405836"/>
+          </a:xfrm>
+          <a:prstGeom prst="rect">
+            <a:avLst/>
+          </a:prstGeom>
+          <a:solidFill>
+            <a:srgbClr val="000000">
+              <a:alpha val="73000"/>
+            </a:srgbClr>
+          </a:solidFill>
+        </p:spPr>
+        <p:style>
+          <a:lnRef idx="2">
+            <a:schemeClr val="accent1">
+              <a:shade val="15000"/>
+            </a:schemeClr>
+          </a:lnRef>
+          <a:fillRef idx="1">
+            <a:schemeClr val="accent1"/>
+          </a:fillRef>
+          <a:effectRef idx="0">
+            <a:schemeClr val="accent1"/>
+          </a:effectRef>
+          <a:fontRef idx="minor">
+            <a:schemeClr val="lt1"/>
+          </a:fontRef>
+        </p:style>
+        <p:txBody>
+          <a:bodyPr rtlCol="0" anchor="ctr"/>
+          <a:lstStyle/>
+          <a:p>
+            <a:pPr algn="ctr"/>
+            <a:endParaRPr lang="sr-Latn-RS">
+              <a:solidFill>
+                <a:srgbClr val="000000"/>
+              </a:solidFill>
+            </a:endParaRPr>
+          </a:p>
+        </p:txBody>
+      </p:sp>
+      <p:pic>
+        <p:nvPicPr>
+          <p:cNvPr id="42" name="Picture 41">
+            <a:extLst>
+              <a:ext uri="{FF2B5EF4-FFF2-40B4-BE49-F238E27FC236}">
+                <a16:creationId xmlns:a16="http://schemas.microsoft.com/office/drawing/2014/main" id="{4B7EC9E4-7CB1-81EB-2E22-E4E21198A8B2}"/>
+              </a:ext>
+            </a:extLst>
+          </p:cNvPr>
+          <p:cNvPicPr>
+            <a:picLocks noChangeAspect="1"/>
+          </p:cNvPicPr>
+          <p:nvPr/>
+        </p:nvPicPr>
+        <p:blipFill>
+          <a:blip r:embed="rId12">
+            <a:alphaModFix amt="50000"/>
+            <a:extLst>
+              <a:ext uri="{28A0092B-C50C-407E-A947-70E740481C1C}">
+                <a14:useLocalDpi xmlns:a14="http://schemas.microsoft.com/office/drawing/2010/main" val="0"/>
+              </a:ext>
+            </a:extLst>
+          </a:blip>
+          <a:stretch>
+            <a:fillRect/>
+          </a:stretch>
+        </p:blipFill>
+        <p:spPr>
+          <a:xfrm flipV="1">
+            <a:off x="-34582" y="-601390"/>
+            <a:ext cx="12257176" cy="9888971"/>
+          </a:xfrm>
+          <a:prstGeom prst="rect">
+            <a:avLst/>
+          </a:prstGeom>
+        </p:spPr>
+      </p:pic>
+      <p:sp>
+        <p:nvSpPr>
+          <p:cNvPr id="43" name="TextBox 42">
+            <a:extLst>
+              <a:ext uri="{FF2B5EF4-FFF2-40B4-BE49-F238E27FC236}">
+                <a16:creationId xmlns:a16="http://schemas.microsoft.com/office/drawing/2014/main" id="{464BC180-DC0D-6157-8CCC-106C70DDBEC1}"/>
+              </a:ext>
+            </a:extLst>
+          </p:cNvPr>
+          <p:cNvSpPr txBox="1"/>
+          <p:nvPr/>
+        </p:nvSpPr>
+        <p:spPr>
+          <a:xfrm>
+            <a:off x="471892" y="1277640"/>
+            <a:ext cx="11453085" cy="4339650"/>
+          </a:xfrm>
+          <a:prstGeom prst="rect">
+            <a:avLst/>
+          </a:prstGeom>
+          <a:noFill/>
+          <a:ln>
+            <a:noFill/>
+          </a:ln>
+        </p:spPr>
+        <p:txBody>
+          <a:bodyPr wrap="square" rtlCol="0">
+            <a:spAutoFit/>
+          </a:bodyPr>
+          <a:lstStyle/>
+          <a:p>
+            <a:pPr algn="ctr"/>
+            <a:r>
+              <a:rPr lang="sr-Latn-RS" sz="13800" b="1" dirty="0">
+                <a:ln w="38100">
+                  <a:solidFill>
+                    <a:schemeClr val="tx1"/>
+                  </a:solidFill>
+                </a:ln>
+                <a:solidFill>
+                  <a:srgbClr val="43FF47"/>
+                </a:solidFill>
+                <a:latin typeface="Times New Roman" panose="02020603050405020304" pitchFamily="18" charset="0"/>
+                <a:cs typeface="Times New Roman" panose="02020603050405020304" pitchFamily="18" charset="0"/>
+              </a:rPr>
+              <a:t>VERSION CONTROL</a:t>
+            </a:r>
+          </a:p>
+        </p:txBody>
+      </p:sp>
     </p:spTree>
     <p:extLst>
       <p:ext uri="{BB962C8B-B14F-4D97-AF65-F5344CB8AC3E}">
@@ -10103,6 +10665,630 @@
   <p:transition>
     <p:fade/>
   </p:transition>
+  <p:timing>
+    <p:tnLst>
+      <p:par>
+        <p:cTn id="1" dur="indefinite" restart="never" nodeType="tmRoot">
+          <p:childTnLst>
+            <p:seq concurrent="1" nextAc="seek">
+              <p:cTn id="2" dur="indefinite" nodeType="mainSeq">
+                <p:childTnLst>
+                  <p:par>
+                    <p:cTn id="3" fill="hold">
+                      <p:stCondLst>
+                        <p:cond delay="indefinite"/>
+                      </p:stCondLst>
+                      <p:childTnLst>
+                        <p:par>
+                          <p:cTn id="4" fill="hold">
+                            <p:stCondLst>
+                              <p:cond delay="0"/>
+                            </p:stCondLst>
+                            <p:childTnLst>
+                              <p:par>
+                                <p:cTn id="5" presetID="22" presetClass="entr" presetSubtype="8" fill="hold" grpId="0" nodeType="clickEffect">
+                                  <p:stCondLst>
+                                    <p:cond delay="0"/>
+                                  </p:stCondLst>
+                                  <p:childTnLst>
+                                    <p:set>
+                                      <p:cBhvr>
+                                        <p:cTn id="6" dur="1" fill="hold">
+                                          <p:stCondLst>
+                                            <p:cond delay="0"/>
+                                          </p:stCondLst>
+                                        </p:cTn>
+                                        <p:tgtEl>
+                                          <p:spTgt spid="3"/>
+                                        </p:tgtEl>
+                                        <p:attrNameLst>
+                                          <p:attrName>style.visibility</p:attrName>
+                                        </p:attrNameLst>
+                                      </p:cBhvr>
+                                      <p:to>
+                                        <p:strVal val="visible"/>
+                                      </p:to>
+                                    </p:set>
+                                    <p:animEffect transition="in" filter="wipe(left)">
+                                      <p:cBhvr>
+                                        <p:cTn id="7" dur="1000"/>
+                                        <p:tgtEl>
+                                          <p:spTgt spid="3"/>
+                                        </p:tgtEl>
+                                      </p:cBhvr>
+                                    </p:animEffect>
+                                  </p:childTnLst>
+                                </p:cTn>
+                              </p:par>
+                            </p:childTnLst>
+                          </p:cTn>
+                        </p:par>
+                      </p:childTnLst>
+                    </p:cTn>
+                  </p:par>
+                  <p:par>
+                    <p:cTn id="8" fill="hold">
+                      <p:stCondLst>
+                        <p:cond delay="indefinite"/>
+                      </p:stCondLst>
+                      <p:childTnLst>
+                        <p:par>
+                          <p:cTn id="9" fill="hold">
+                            <p:stCondLst>
+                              <p:cond delay="0"/>
+                            </p:stCondLst>
+                            <p:childTnLst>
+                              <p:par>
+                                <p:cTn id="10" presetID="22" presetClass="entr" presetSubtype="8" fill="hold" grpId="0" nodeType="clickEffect">
+                                  <p:stCondLst>
+                                    <p:cond delay="0"/>
+                                  </p:stCondLst>
+                                  <p:childTnLst>
+                                    <p:set>
+                                      <p:cBhvr>
+                                        <p:cTn id="11" dur="1" fill="hold">
+                                          <p:stCondLst>
+                                            <p:cond delay="0"/>
+                                          </p:stCondLst>
+                                        </p:cTn>
+                                        <p:tgtEl>
+                                          <p:spTgt spid="7"/>
+                                        </p:tgtEl>
+                                        <p:attrNameLst>
+                                          <p:attrName>style.visibility</p:attrName>
+                                        </p:attrNameLst>
+                                      </p:cBhvr>
+                                      <p:to>
+                                        <p:strVal val="visible"/>
+                                      </p:to>
+                                    </p:set>
+                                    <p:animEffect transition="in" filter="wipe(left)">
+                                      <p:cBhvr>
+                                        <p:cTn id="12" dur="1000"/>
+                                        <p:tgtEl>
+                                          <p:spTgt spid="7"/>
+                                        </p:tgtEl>
+                                      </p:cBhvr>
+                                    </p:animEffect>
+                                  </p:childTnLst>
+                                </p:cTn>
+                              </p:par>
+                            </p:childTnLst>
+                          </p:cTn>
+                        </p:par>
+                      </p:childTnLst>
+                    </p:cTn>
+                  </p:par>
+                  <p:par>
+                    <p:cTn id="13" fill="hold">
+                      <p:stCondLst>
+                        <p:cond delay="indefinite"/>
+                      </p:stCondLst>
+                      <p:childTnLst>
+                        <p:par>
+                          <p:cTn id="14" fill="hold">
+                            <p:stCondLst>
+                              <p:cond delay="0"/>
+                            </p:stCondLst>
+                            <p:childTnLst>
+                              <p:par>
+                                <p:cTn id="15" presetID="22" presetClass="entr" presetSubtype="8" fill="hold" grpId="0" nodeType="clickEffect">
+                                  <p:stCondLst>
+                                    <p:cond delay="0"/>
+                                  </p:stCondLst>
+                                  <p:childTnLst>
+                                    <p:set>
+                                      <p:cBhvr>
+                                        <p:cTn id="16" dur="1" fill="hold">
+                                          <p:stCondLst>
+                                            <p:cond delay="0"/>
+                                          </p:stCondLst>
+                                        </p:cTn>
+                                        <p:tgtEl>
+                                          <p:spTgt spid="8"/>
+                                        </p:tgtEl>
+                                        <p:attrNameLst>
+                                          <p:attrName>style.visibility</p:attrName>
+                                        </p:attrNameLst>
+                                      </p:cBhvr>
+                                      <p:to>
+                                        <p:strVal val="visible"/>
+                                      </p:to>
+                                    </p:set>
+                                    <p:animEffect transition="in" filter="wipe(left)">
+                                      <p:cBhvr>
+                                        <p:cTn id="17" dur="500"/>
+                                        <p:tgtEl>
+                                          <p:spTgt spid="8"/>
+                                        </p:tgtEl>
+                                      </p:cBhvr>
+                                    </p:animEffect>
+                                  </p:childTnLst>
+                                </p:cTn>
+                              </p:par>
+                              <p:par>
+                                <p:cTn id="18" presetID="22" presetClass="entr" presetSubtype="2" fill="hold" nodeType="withEffect">
+                                  <p:stCondLst>
+                                    <p:cond delay="0"/>
+                                  </p:stCondLst>
+                                  <p:childTnLst>
+                                    <p:set>
+                                      <p:cBhvr>
+                                        <p:cTn id="19" dur="1" fill="hold">
+                                          <p:stCondLst>
+                                            <p:cond delay="0"/>
+                                          </p:stCondLst>
+                                        </p:cTn>
+                                        <p:tgtEl>
+                                          <p:spTgt spid="31"/>
+                                        </p:tgtEl>
+                                        <p:attrNameLst>
+                                          <p:attrName>style.visibility</p:attrName>
+                                        </p:attrNameLst>
+                                      </p:cBhvr>
+                                      <p:to>
+                                        <p:strVal val="visible"/>
+                                      </p:to>
+                                    </p:set>
+                                    <p:animEffect transition="in" filter="wipe(right)">
+                                      <p:cBhvr>
+                                        <p:cTn id="20" dur="500"/>
+                                        <p:tgtEl>
+                                          <p:spTgt spid="31"/>
+                                        </p:tgtEl>
+                                      </p:cBhvr>
+                                    </p:animEffect>
+                                  </p:childTnLst>
+                                </p:cTn>
+                              </p:par>
+                            </p:childTnLst>
+                          </p:cTn>
+                        </p:par>
+                      </p:childTnLst>
+                    </p:cTn>
+                  </p:par>
+                  <p:par>
+                    <p:cTn id="21" fill="hold">
+                      <p:stCondLst>
+                        <p:cond delay="indefinite"/>
+                      </p:stCondLst>
+                      <p:childTnLst>
+                        <p:par>
+                          <p:cTn id="22" fill="hold">
+                            <p:stCondLst>
+                              <p:cond delay="0"/>
+                            </p:stCondLst>
+                            <p:childTnLst>
+                              <p:par>
+                                <p:cTn id="23" presetID="22" presetClass="entr" presetSubtype="8" fill="hold" grpId="0" nodeType="clickEffect">
+                                  <p:stCondLst>
+                                    <p:cond delay="0"/>
+                                  </p:stCondLst>
+                                  <p:childTnLst>
+                                    <p:set>
+                                      <p:cBhvr>
+                                        <p:cTn id="24" dur="1" fill="hold">
+                                          <p:stCondLst>
+                                            <p:cond delay="0"/>
+                                          </p:stCondLst>
+                                        </p:cTn>
+                                        <p:tgtEl>
+                                          <p:spTgt spid="30"/>
+                                        </p:tgtEl>
+                                        <p:attrNameLst>
+                                          <p:attrName>style.visibility</p:attrName>
+                                        </p:attrNameLst>
+                                      </p:cBhvr>
+                                      <p:to>
+                                        <p:strVal val="visible"/>
+                                      </p:to>
+                                    </p:set>
+                                    <p:animEffect transition="in" filter="wipe(left)">
+                                      <p:cBhvr>
+                                        <p:cTn id="25" dur="1000"/>
+                                        <p:tgtEl>
+                                          <p:spTgt spid="30"/>
+                                        </p:tgtEl>
+                                      </p:cBhvr>
+                                    </p:animEffect>
+                                  </p:childTnLst>
+                                </p:cTn>
+                              </p:par>
+                            </p:childTnLst>
+                          </p:cTn>
+                        </p:par>
+                      </p:childTnLst>
+                    </p:cTn>
+                  </p:par>
+                  <p:par>
+                    <p:cTn id="26" fill="hold">
+                      <p:stCondLst>
+                        <p:cond delay="indefinite"/>
+                      </p:stCondLst>
+                      <p:childTnLst>
+                        <p:par>
+                          <p:cTn id="27" fill="hold">
+                            <p:stCondLst>
+                              <p:cond delay="0"/>
+                            </p:stCondLst>
+                            <p:childTnLst>
+                              <p:par>
+                                <p:cTn id="28" presetID="22" presetClass="entr" presetSubtype="8" fill="hold" grpId="0" nodeType="clickEffect">
+                                  <p:stCondLst>
+                                    <p:cond delay="0"/>
+                                  </p:stCondLst>
+                                  <p:childTnLst>
+                                    <p:set>
+                                      <p:cBhvr>
+                                        <p:cTn id="29" dur="1" fill="hold">
+                                          <p:stCondLst>
+                                            <p:cond delay="0"/>
+                                          </p:stCondLst>
+                                        </p:cTn>
+                                        <p:tgtEl>
+                                          <p:spTgt spid="33"/>
+                                        </p:tgtEl>
+                                        <p:attrNameLst>
+                                          <p:attrName>style.visibility</p:attrName>
+                                        </p:attrNameLst>
+                                      </p:cBhvr>
+                                      <p:to>
+                                        <p:strVal val="visible"/>
+                                      </p:to>
+                                    </p:set>
+                                    <p:animEffect transition="in" filter="wipe(left)">
+                                      <p:cBhvr>
+                                        <p:cTn id="30" dur="1000"/>
+                                        <p:tgtEl>
+                                          <p:spTgt spid="33"/>
+                                        </p:tgtEl>
+                                      </p:cBhvr>
+                                    </p:animEffect>
+                                  </p:childTnLst>
+                                </p:cTn>
+                              </p:par>
+                              <p:par>
+                                <p:cTn id="31" presetID="22" presetClass="entr" presetSubtype="2" fill="hold" nodeType="withEffect">
+                                  <p:stCondLst>
+                                    <p:cond delay="0"/>
+                                  </p:stCondLst>
+                                  <p:childTnLst>
+                                    <p:set>
+                                      <p:cBhvr>
+                                        <p:cTn id="32" dur="1" fill="hold">
+                                          <p:stCondLst>
+                                            <p:cond delay="0"/>
+                                          </p:stCondLst>
+                                        </p:cTn>
+                                        <p:tgtEl>
+                                          <p:spTgt spid="38"/>
+                                        </p:tgtEl>
+                                        <p:attrNameLst>
+                                          <p:attrName>style.visibility</p:attrName>
+                                        </p:attrNameLst>
+                                      </p:cBhvr>
+                                      <p:to>
+                                        <p:strVal val="visible"/>
+                                      </p:to>
+                                    </p:set>
+                                    <p:animEffect transition="in" filter="wipe(right)">
+                                      <p:cBhvr>
+                                        <p:cTn id="33" dur="500"/>
+                                        <p:tgtEl>
+                                          <p:spTgt spid="38"/>
+                                        </p:tgtEl>
+                                      </p:cBhvr>
+                                    </p:animEffect>
+                                  </p:childTnLst>
+                                </p:cTn>
+                              </p:par>
+                            </p:childTnLst>
+                          </p:cTn>
+                        </p:par>
+                      </p:childTnLst>
+                    </p:cTn>
+                  </p:par>
+                  <p:par>
+                    <p:cTn id="34" fill="hold">
+                      <p:stCondLst>
+                        <p:cond delay="indefinite"/>
+                      </p:stCondLst>
+                      <p:childTnLst>
+                        <p:par>
+                          <p:cTn id="35" fill="hold">
+                            <p:stCondLst>
+                              <p:cond delay="0"/>
+                            </p:stCondLst>
+                            <p:childTnLst>
+                              <p:par>
+                                <p:cTn id="36" presetID="22" presetClass="entr" presetSubtype="8" fill="hold" grpId="0" nodeType="clickEffect">
+                                  <p:stCondLst>
+                                    <p:cond delay="0"/>
+                                  </p:stCondLst>
+                                  <p:childTnLst>
+                                    <p:set>
+                                      <p:cBhvr>
+                                        <p:cTn id="37" dur="1" fill="hold">
+                                          <p:stCondLst>
+                                            <p:cond delay="0"/>
+                                          </p:stCondLst>
+                                        </p:cTn>
+                                        <p:tgtEl>
+                                          <p:spTgt spid="35"/>
+                                        </p:tgtEl>
+                                        <p:attrNameLst>
+                                          <p:attrName>style.visibility</p:attrName>
+                                        </p:attrNameLst>
+                                      </p:cBhvr>
+                                      <p:to>
+                                        <p:strVal val="visible"/>
+                                      </p:to>
+                                    </p:set>
+                                    <p:animEffect transition="in" filter="wipe(left)">
+                                      <p:cBhvr>
+                                        <p:cTn id="38" dur="1000"/>
+                                        <p:tgtEl>
+                                          <p:spTgt spid="35"/>
+                                        </p:tgtEl>
+                                      </p:cBhvr>
+                                    </p:animEffect>
+                                  </p:childTnLst>
+                                </p:cTn>
+                              </p:par>
+                              <p:par>
+                                <p:cTn id="39" presetID="22" presetClass="entr" presetSubtype="2" fill="hold" nodeType="withEffect">
+                                  <p:stCondLst>
+                                    <p:cond delay="0"/>
+                                  </p:stCondLst>
+                                  <p:childTnLst>
+                                    <p:set>
+                                      <p:cBhvr>
+                                        <p:cTn id="40" dur="1" fill="hold">
+                                          <p:stCondLst>
+                                            <p:cond delay="0"/>
+                                          </p:stCondLst>
+                                        </p:cTn>
+                                        <p:tgtEl>
+                                          <p:spTgt spid="40"/>
+                                        </p:tgtEl>
+                                        <p:attrNameLst>
+                                          <p:attrName>style.visibility</p:attrName>
+                                        </p:attrNameLst>
+                                      </p:cBhvr>
+                                      <p:to>
+                                        <p:strVal val="visible"/>
+                                      </p:to>
+                                    </p:set>
+                                    <p:animEffect transition="in" filter="wipe(right)">
+                                      <p:cBhvr>
+                                        <p:cTn id="41" dur="500"/>
+                                        <p:tgtEl>
+                                          <p:spTgt spid="40"/>
+                                        </p:tgtEl>
+                                      </p:cBhvr>
+                                    </p:animEffect>
+                                  </p:childTnLst>
+                                </p:cTn>
+                              </p:par>
+                            </p:childTnLst>
+                          </p:cTn>
+                        </p:par>
+                      </p:childTnLst>
+                    </p:cTn>
+                  </p:par>
+                  <p:par>
+                    <p:cTn id="42" fill="hold">
+                      <p:stCondLst>
+                        <p:cond delay="indefinite"/>
+                      </p:stCondLst>
+                      <p:childTnLst>
+                        <p:par>
+                          <p:cTn id="43" fill="hold">
+                            <p:stCondLst>
+                              <p:cond delay="0"/>
+                            </p:stCondLst>
+                            <p:childTnLst>
+                              <p:par>
+                                <p:cTn id="44" presetID="10" presetClass="entr" presetSubtype="0" fill="hold" grpId="0" nodeType="clickEffect">
+                                  <p:stCondLst>
+                                    <p:cond delay="0"/>
+                                  </p:stCondLst>
+                                  <p:childTnLst>
+                                    <p:set>
+                                      <p:cBhvr>
+                                        <p:cTn id="45" dur="1" fill="hold">
+                                          <p:stCondLst>
+                                            <p:cond delay="0"/>
+                                          </p:stCondLst>
+                                        </p:cTn>
+                                        <p:tgtEl>
+                                          <p:spTgt spid="44"/>
+                                        </p:tgtEl>
+                                        <p:attrNameLst>
+                                          <p:attrName>style.visibility</p:attrName>
+                                        </p:attrNameLst>
+                                      </p:cBhvr>
+                                      <p:to>
+                                        <p:strVal val="visible"/>
+                                      </p:to>
+                                    </p:set>
+                                    <p:animEffect transition="in" filter="fade">
+                                      <p:cBhvr>
+                                        <p:cTn id="46" dur="500"/>
+                                        <p:tgtEl>
+                                          <p:spTgt spid="44"/>
+                                        </p:tgtEl>
+                                      </p:cBhvr>
+                                    </p:animEffect>
+                                  </p:childTnLst>
+                                </p:cTn>
+                              </p:par>
+                              <p:par>
+                                <p:cTn id="47" presetID="10" presetClass="entr" presetSubtype="0" fill="hold" nodeType="withEffect">
+                                  <p:stCondLst>
+                                    <p:cond delay="0"/>
+                                  </p:stCondLst>
+                                  <p:childTnLst>
+                                    <p:set>
+                                      <p:cBhvr>
+                                        <p:cTn id="48" dur="1" fill="hold">
+                                          <p:stCondLst>
+                                            <p:cond delay="0"/>
+                                          </p:stCondLst>
+                                        </p:cTn>
+                                        <p:tgtEl>
+                                          <p:spTgt spid="42"/>
+                                        </p:tgtEl>
+                                        <p:attrNameLst>
+                                          <p:attrName>style.visibility</p:attrName>
+                                        </p:attrNameLst>
+                                      </p:cBhvr>
+                                      <p:to>
+                                        <p:strVal val="visible"/>
+                                      </p:to>
+                                    </p:set>
+                                    <p:animEffect transition="in" filter="fade">
+                                      <p:cBhvr>
+                                        <p:cTn id="49" dur="500"/>
+                                        <p:tgtEl>
+                                          <p:spTgt spid="42"/>
+                                        </p:tgtEl>
+                                      </p:cBhvr>
+                                    </p:animEffect>
+                                  </p:childTnLst>
+                                </p:cTn>
+                              </p:par>
+                              <p:par>
+                                <p:cTn id="50" presetID="2" presetClass="entr" presetSubtype="4" fill="hold" grpId="0" nodeType="withEffect">
+                                  <p:stCondLst>
+                                    <p:cond delay="0"/>
+                                  </p:stCondLst>
+                                  <p:childTnLst>
+                                    <p:set>
+                                      <p:cBhvr>
+                                        <p:cTn id="51" dur="1" fill="hold">
+                                          <p:stCondLst>
+                                            <p:cond delay="0"/>
+                                          </p:stCondLst>
+                                        </p:cTn>
+                                        <p:tgtEl>
+                                          <p:spTgt spid="43"/>
+                                        </p:tgtEl>
+                                        <p:attrNameLst>
+                                          <p:attrName>style.visibility</p:attrName>
+                                        </p:attrNameLst>
+                                      </p:cBhvr>
+                                      <p:to>
+                                        <p:strVal val="visible"/>
+                                      </p:to>
+                                    </p:set>
+                                    <p:anim calcmode="lin" valueType="num">
+                                      <p:cBhvr additive="base">
+                                        <p:cTn id="52" dur="1000" fill="hold"/>
+                                        <p:tgtEl>
+                                          <p:spTgt spid="43"/>
+                                        </p:tgtEl>
+                                        <p:attrNameLst>
+                                          <p:attrName>ppt_x</p:attrName>
+                                        </p:attrNameLst>
+                                      </p:cBhvr>
+                                      <p:tavLst>
+                                        <p:tav tm="0">
+                                          <p:val>
+                                            <p:strVal val="#ppt_x"/>
+                                          </p:val>
+                                        </p:tav>
+                                        <p:tav tm="100000">
+                                          <p:val>
+                                            <p:strVal val="#ppt_x"/>
+                                          </p:val>
+                                        </p:tav>
+                                      </p:tavLst>
+                                    </p:anim>
+                                    <p:anim calcmode="lin" valueType="num">
+                                      <p:cBhvr additive="base">
+                                        <p:cTn id="53" dur="1000" fill="hold"/>
+                                        <p:tgtEl>
+                                          <p:spTgt spid="43"/>
+                                        </p:tgtEl>
+                                        <p:attrNameLst>
+                                          <p:attrName>ppt_y</p:attrName>
+                                        </p:attrNameLst>
+                                      </p:cBhvr>
+                                      <p:tavLst>
+                                        <p:tav tm="0">
+                                          <p:val>
+                                            <p:strVal val="1+#ppt_h/2"/>
+                                          </p:val>
+                                        </p:tav>
+                                        <p:tav tm="100000">
+                                          <p:val>
+                                            <p:strVal val="#ppt_y"/>
+                                          </p:val>
+                                        </p:tav>
+                                      </p:tavLst>
+                                    </p:anim>
+                                  </p:childTnLst>
+                                </p:cTn>
+                              </p:par>
+                            </p:childTnLst>
+                          </p:cTn>
+                        </p:par>
+                      </p:childTnLst>
+                    </p:cTn>
+                  </p:par>
+                </p:childTnLst>
+              </p:cTn>
+              <p:prevCondLst>
+                <p:cond evt="onPrev" delay="0">
+                  <p:tgtEl>
+                    <p:sldTgt/>
+                  </p:tgtEl>
+                </p:cond>
+              </p:prevCondLst>
+              <p:nextCondLst>
+                <p:cond evt="onNext" delay="0">
+                  <p:tgtEl>
+                    <p:sldTgt/>
+                  </p:tgtEl>
+                </p:cond>
+              </p:nextCondLst>
+            </p:seq>
+          </p:childTnLst>
+        </p:cTn>
+      </p:par>
+    </p:tnLst>
+    <p:bldLst>
+      <p:bldP spid="3" grpId="0"/>
+      <p:bldP spid="7" grpId="0"/>
+      <p:bldP spid="8" grpId="0"/>
+      <p:bldP spid="30" grpId="0"/>
+      <p:bldP spid="33" grpId="0"/>
+      <p:bldP spid="35" grpId="0"/>
+      <p:bldP spid="44" grpId="0" animBg="1"/>
+      <p:bldP spid="43" grpId="0" animBg="1"/>
+    </p:bldLst>
+  </p:timing>
 </p:sld>
 </file>
 

</xml_diff>